<commit_message>
[InfeRS] Updates Presentation and Documents
</commit_message>
<xml_diff>
--- a/infeRS/InfeRS - Pictue Presentation.pptx
+++ b/infeRS/InfeRS - Pictue Presentation.pptx
@@ -29,6 +29,14 @@
     <p:sldId id="277" r:id="rId23"/>
     <p:sldId id="278" r:id="rId24"/>
     <p:sldId id="279" r:id="rId25"/>
+    <p:sldId id="280" r:id="rId26"/>
+    <p:sldId id="281" r:id="rId27"/>
+    <p:sldId id="282" r:id="rId28"/>
+    <p:sldId id="283" r:id="rId29"/>
+    <p:sldId id="284" r:id="rId30"/>
+    <p:sldId id="285" r:id="rId31"/>
+    <p:sldId id="286" r:id="rId32"/>
+    <p:sldId id="287" r:id="rId33"/>
   </p:sldIdLst>
   <p:sldSz cx="12192000" cy="6858000"/>
   <p:notesSz cx="6858000" cy="9144000"/>
@@ -127,22 +135,6 @@
       </a:defRPr>
     </a:lvl9pPr>
   </p:defaultTextStyle>
-  <p:extLst>
-    <p:ext uri="{EFAFB233-063F-42B5-8137-9DF3F51BA10A}">
-      <p15:sldGuideLst xmlns:p15="http://schemas.microsoft.com/office/powerpoint/2012/main">
-        <p15:guide id="1" orient="horz" pos="2160" userDrawn="1">
-          <p15:clr>
-            <a:srgbClr val="A4A3A4"/>
-          </p15:clr>
-        </p15:guide>
-        <p15:guide id="2" pos="3840" userDrawn="1">
-          <p15:clr>
-            <a:srgbClr val="A4A3A4"/>
-          </p15:clr>
-        </p15:guide>
-      </p15:sldGuideLst>
-    </p:ext>
-  </p:extLst>
 </p:presentation>
 </file>
 
@@ -201,9 +193,9 @@
           <a:bodyPr/>
           <a:lstStyle/>
           <a:p>
-            <a:fld id="{14CB9B63-4AB8-453B-AC33-6985D7771E2E}" type="datetimeFigureOut">
+            <a:fld id="{C504AB67-A86F-405E-8A23-C149CE6BB094}" type="datetimeFigureOut">
               <a:rPr lang="en-US" smtClean="0"/>
-              <a:t>3/30/2017</a:t>
+              <a:t>4/13/2017</a:t>
             </a:fld>
             <a:endParaRPr lang="en-US"/>
           </a:p>
@@ -243,7 +235,7 @@
           <a:bodyPr/>
           <a:lstStyle/>
           <a:p>
-            <a:fld id="{4C6AFEFE-71FB-4FD9-B970-D30BD2F8B894}" type="slidenum">
+            <a:fld id="{3093A2E0-583D-4781-B341-60651664ECF8}" type="slidenum">
               <a:rPr lang="en-US" smtClean="0"/>
               <a:t>‹#›</a:t>
             </a:fld>
@@ -254,7 +246,7 @@
     </p:spTree>
     <p:extLst>
       <p:ext uri="{BB962C8B-B14F-4D97-AF65-F5344CB8AC3E}">
-        <p14:creationId xmlns:p14="http://schemas.microsoft.com/office/powerpoint/2010/main" val="3487469962"/>
+        <p14:creationId xmlns:p14="http://schemas.microsoft.com/office/powerpoint/2010/main" val="4169394483"/>
       </p:ext>
     </p:extLst>
   </p:cSld>
@@ -414,9 +406,9 @@
             </a:lvl1pPr>
           </a:lstStyle>
           <a:p>
-            <a:fld id="{14CB9B63-4AB8-453B-AC33-6985D7771E2E}" type="datetimeFigureOut">
+            <a:fld id="{C504AB67-A86F-405E-8A23-C149CE6BB094}" type="datetimeFigureOut">
               <a:rPr lang="en-US" smtClean="0"/>
-              <a:t>3/30/2017</a:t>
+              <a:t>4/13/2017</a:t>
             </a:fld>
             <a:endParaRPr lang="en-US"/>
           </a:p>
@@ -492,7 +484,7 @@
             </a:lvl1pPr>
           </a:lstStyle>
           <a:p>
-            <a:fld id="{4C6AFEFE-71FB-4FD9-B970-D30BD2F8B894}" type="slidenum">
+            <a:fld id="{3093A2E0-583D-4781-B341-60651664ECF8}" type="slidenum">
               <a:rPr lang="en-US" smtClean="0"/>
               <a:t>‹#›</a:t>
             </a:fld>
@@ -503,7 +495,7 @@
     </p:spTree>
     <p:extLst>
       <p:ext uri="{BB962C8B-B14F-4D97-AF65-F5344CB8AC3E}">
-        <p14:creationId xmlns:p14="http://schemas.microsoft.com/office/powerpoint/2010/main" val="1386440862"/>
+        <p14:creationId xmlns:p14="http://schemas.microsoft.com/office/powerpoint/2010/main" val="2081866364"/>
       </p:ext>
     </p:extLst>
   </p:cSld>
@@ -861,20 +853,20 @@
     </p:spTree>
     <p:extLst>
       <p:ext uri="{BB962C8B-B14F-4D97-AF65-F5344CB8AC3E}">
-        <p14:creationId xmlns:p14="http://schemas.microsoft.com/office/powerpoint/2010/main" val="4180001194"/>
+        <p14:creationId xmlns:p14="http://schemas.microsoft.com/office/powerpoint/2010/main" val="2366269342"/>
       </p:ext>
     </p:extLst>
   </p:cSld>
   <p:clrMapOvr>
     <a:masterClrMapping/>
   </p:clrMapOvr>
-  <mc:AlternateContent xmlns:mc="http://schemas.openxmlformats.org/markup-compatibility/2006" xmlns:p14="http://schemas.microsoft.com/office/powerpoint/2010/main">
-    <mc:Choice Requires="p14">
+  <mc:AlternateContent xmlns:mc="http://schemas.openxmlformats.org/markup-compatibility/2006">
+    <mc:Choice xmlns:p14="http://schemas.microsoft.com/office/powerpoint/2010/main" Requires="p14">
       <p:transition spd="med" p14:dur="700">
         <p:fade/>
       </p:transition>
     </mc:Choice>
-    <mc:Fallback xmlns="">
+    <mc:Fallback>
       <p:transition spd="med">
         <p:fade/>
       </p:transition>
@@ -950,20 +942,20 @@
     </p:spTree>
     <p:extLst>
       <p:ext uri="{BB962C8B-B14F-4D97-AF65-F5344CB8AC3E}">
-        <p14:creationId xmlns:p14="http://schemas.microsoft.com/office/powerpoint/2010/main" val="3165980032"/>
+        <p14:creationId xmlns:p14="http://schemas.microsoft.com/office/powerpoint/2010/main" val="819968595"/>
       </p:ext>
     </p:extLst>
   </p:cSld>
   <p:clrMapOvr>
     <a:masterClrMapping/>
   </p:clrMapOvr>
-  <mc:AlternateContent xmlns:mc="http://schemas.openxmlformats.org/markup-compatibility/2006" xmlns:p14="http://schemas.microsoft.com/office/powerpoint/2010/main">
-    <mc:Choice Requires="p14">
+  <mc:AlternateContent xmlns:mc="http://schemas.openxmlformats.org/markup-compatibility/2006">
+    <mc:Choice xmlns:p14="http://schemas.microsoft.com/office/powerpoint/2010/main" Requires="p14">
       <p:transition spd="med" p14:dur="700">
         <p:fade/>
       </p:transition>
     </mc:Choice>
-    <mc:Fallback xmlns="">
+    <mc:Fallback>
       <p:transition spd="med">
         <p:fade/>
       </p:transition>
@@ -1039,20 +1031,20 @@
     </p:spTree>
     <p:extLst>
       <p:ext uri="{BB962C8B-B14F-4D97-AF65-F5344CB8AC3E}">
-        <p14:creationId xmlns:p14="http://schemas.microsoft.com/office/powerpoint/2010/main" val="2479691796"/>
+        <p14:creationId xmlns:p14="http://schemas.microsoft.com/office/powerpoint/2010/main" val="1931295485"/>
       </p:ext>
     </p:extLst>
   </p:cSld>
   <p:clrMapOvr>
     <a:masterClrMapping/>
   </p:clrMapOvr>
-  <mc:AlternateContent xmlns:mc="http://schemas.openxmlformats.org/markup-compatibility/2006" xmlns:p14="http://schemas.microsoft.com/office/powerpoint/2010/main">
-    <mc:Choice Requires="p14">
+  <mc:AlternateContent xmlns:mc="http://schemas.openxmlformats.org/markup-compatibility/2006">
+    <mc:Choice xmlns:p14="http://schemas.microsoft.com/office/powerpoint/2010/main" Requires="p14">
       <p:transition spd="med" p14:dur="700">
         <p:fade/>
       </p:transition>
     </mc:Choice>
-    <mc:Fallback xmlns="">
+    <mc:Fallback>
       <p:transition spd="med">
         <p:fade/>
       </p:transition>
@@ -1128,20 +1120,20 @@
     </p:spTree>
     <p:extLst>
       <p:ext uri="{BB962C8B-B14F-4D97-AF65-F5344CB8AC3E}">
-        <p14:creationId xmlns:p14="http://schemas.microsoft.com/office/powerpoint/2010/main" val="272673988"/>
+        <p14:creationId xmlns:p14="http://schemas.microsoft.com/office/powerpoint/2010/main" val="685842805"/>
       </p:ext>
     </p:extLst>
   </p:cSld>
   <p:clrMapOvr>
     <a:masterClrMapping/>
   </p:clrMapOvr>
-  <mc:AlternateContent xmlns:mc="http://schemas.openxmlformats.org/markup-compatibility/2006" xmlns:p14="http://schemas.microsoft.com/office/powerpoint/2010/main">
-    <mc:Choice Requires="p14">
+  <mc:AlternateContent xmlns:mc="http://schemas.openxmlformats.org/markup-compatibility/2006">
+    <mc:Choice xmlns:p14="http://schemas.microsoft.com/office/powerpoint/2010/main" Requires="p14">
       <p:transition spd="med" p14:dur="700">
         <p:fade/>
       </p:transition>
     </mc:Choice>
-    <mc:Fallback xmlns="">
+    <mc:Fallback>
       <p:transition spd="med">
         <p:fade/>
       </p:transition>
@@ -1217,20 +1209,20 @@
     </p:spTree>
     <p:extLst>
       <p:ext uri="{BB962C8B-B14F-4D97-AF65-F5344CB8AC3E}">
-        <p14:creationId xmlns:p14="http://schemas.microsoft.com/office/powerpoint/2010/main" val="1346043765"/>
+        <p14:creationId xmlns:p14="http://schemas.microsoft.com/office/powerpoint/2010/main" val="3071288575"/>
       </p:ext>
     </p:extLst>
   </p:cSld>
   <p:clrMapOvr>
     <a:masterClrMapping/>
   </p:clrMapOvr>
-  <mc:AlternateContent xmlns:mc="http://schemas.openxmlformats.org/markup-compatibility/2006" xmlns:p14="http://schemas.microsoft.com/office/powerpoint/2010/main">
-    <mc:Choice Requires="p14">
+  <mc:AlternateContent xmlns:mc="http://schemas.openxmlformats.org/markup-compatibility/2006">
+    <mc:Choice xmlns:p14="http://schemas.microsoft.com/office/powerpoint/2010/main" Requires="p14">
       <p:transition spd="med" p14:dur="700">
         <p:fade/>
       </p:transition>
     </mc:Choice>
-    <mc:Fallback xmlns="">
+    <mc:Fallback>
       <p:transition spd="med">
         <p:fade/>
       </p:transition>
@@ -1306,20 +1298,20 @@
     </p:spTree>
     <p:extLst>
       <p:ext uri="{BB962C8B-B14F-4D97-AF65-F5344CB8AC3E}">
-        <p14:creationId xmlns:p14="http://schemas.microsoft.com/office/powerpoint/2010/main" val="3359894711"/>
+        <p14:creationId xmlns:p14="http://schemas.microsoft.com/office/powerpoint/2010/main" val="621773021"/>
       </p:ext>
     </p:extLst>
   </p:cSld>
   <p:clrMapOvr>
     <a:masterClrMapping/>
   </p:clrMapOvr>
-  <mc:AlternateContent xmlns:mc="http://schemas.openxmlformats.org/markup-compatibility/2006" xmlns:p14="http://schemas.microsoft.com/office/powerpoint/2010/main">
-    <mc:Choice Requires="p14">
+  <mc:AlternateContent xmlns:mc="http://schemas.openxmlformats.org/markup-compatibility/2006">
+    <mc:Choice xmlns:p14="http://schemas.microsoft.com/office/powerpoint/2010/main" Requires="p14">
       <p:transition spd="med" p14:dur="700">
         <p:fade/>
       </p:transition>
     </mc:Choice>
-    <mc:Fallback xmlns="">
+    <mc:Fallback>
       <p:transition spd="med">
         <p:fade/>
       </p:transition>
@@ -1395,20 +1387,20 @@
     </p:spTree>
     <p:extLst>
       <p:ext uri="{BB962C8B-B14F-4D97-AF65-F5344CB8AC3E}">
-        <p14:creationId xmlns:p14="http://schemas.microsoft.com/office/powerpoint/2010/main" val="3437489096"/>
+        <p14:creationId xmlns:p14="http://schemas.microsoft.com/office/powerpoint/2010/main" val="4271427197"/>
       </p:ext>
     </p:extLst>
   </p:cSld>
   <p:clrMapOvr>
     <a:masterClrMapping/>
   </p:clrMapOvr>
-  <mc:AlternateContent xmlns:mc="http://schemas.openxmlformats.org/markup-compatibility/2006" xmlns:p14="http://schemas.microsoft.com/office/powerpoint/2010/main">
-    <mc:Choice Requires="p14">
+  <mc:AlternateContent xmlns:mc="http://schemas.openxmlformats.org/markup-compatibility/2006">
+    <mc:Choice xmlns:p14="http://schemas.microsoft.com/office/powerpoint/2010/main" Requires="p14">
       <p:transition spd="med" p14:dur="700">
         <p:fade/>
       </p:transition>
     </mc:Choice>
-    <mc:Fallback xmlns="">
+    <mc:Fallback>
       <p:transition spd="med">
         <p:fade/>
       </p:transition>
@@ -1484,20 +1476,20 @@
     </p:spTree>
     <p:extLst>
       <p:ext uri="{BB962C8B-B14F-4D97-AF65-F5344CB8AC3E}">
-        <p14:creationId xmlns:p14="http://schemas.microsoft.com/office/powerpoint/2010/main" val="2791811968"/>
+        <p14:creationId xmlns:p14="http://schemas.microsoft.com/office/powerpoint/2010/main" val="2432418785"/>
       </p:ext>
     </p:extLst>
   </p:cSld>
   <p:clrMapOvr>
     <a:masterClrMapping/>
   </p:clrMapOvr>
-  <mc:AlternateContent xmlns:mc="http://schemas.openxmlformats.org/markup-compatibility/2006" xmlns:p14="http://schemas.microsoft.com/office/powerpoint/2010/main">
-    <mc:Choice Requires="p14">
+  <mc:AlternateContent xmlns:mc="http://schemas.openxmlformats.org/markup-compatibility/2006">
+    <mc:Choice xmlns:p14="http://schemas.microsoft.com/office/powerpoint/2010/main" Requires="p14">
       <p:transition spd="med" p14:dur="700">
         <p:fade/>
       </p:transition>
     </mc:Choice>
-    <mc:Fallback xmlns="">
+    <mc:Fallback>
       <p:transition spd="med">
         <p:fade/>
       </p:transition>
@@ -1573,20 +1565,20 @@
     </p:spTree>
     <p:extLst>
       <p:ext uri="{BB962C8B-B14F-4D97-AF65-F5344CB8AC3E}">
-        <p14:creationId xmlns:p14="http://schemas.microsoft.com/office/powerpoint/2010/main" val="1248263593"/>
+        <p14:creationId xmlns:p14="http://schemas.microsoft.com/office/powerpoint/2010/main" val="4068553480"/>
       </p:ext>
     </p:extLst>
   </p:cSld>
   <p:clrMapOvr>
     <a:masterClrMapping/>
   </p:clrMapOvr>
-  <mc:AlternateContent xmlns:mc="http://schemas.openxmlformats.org/markup-compatibility/2006" xmlns:p14="http://schemas.microsoft.com/office/powerpoint/2010/main">
-    <mc:Choice Requires="p14">
+  <mc:AlternateContent xmlns:mc="http://schemas.openxmlformats.org/markup-compatibility/2006">
+    <mc:Choice xmlns:p14="http://schemas.microsoft.com/office/powerpoint/2010/main" Requires="p14">
       <p:transition spd="med" p14:dur="700">
         <p:fade/>
       </p:transition>
     </mc:Choice>
-    <mc:Fallback xmlns="">
+    <mc:Fallback>
       <p:transition spd="med">
         <p:fade/>
       </p:transition>
@@ -1662,20 +1654,20 @@
     </p:spTree>
     <p:extLst>
       <p:ext uri="{BB962C8B-B14F-4D97-AF65-F5344CB8AC3E}">
-        <p14:creationId xmlns:p14="http://schemas.microsoft.com/office/powerpoint/2010/main" val="3005706484"/>
+        <p14:creationId xmlns:p14="http://schemas.microsoft.com/office/powerpoint/2010/main" val="1948085754"/>
       </p:ext>
     </p:extLst>
   </p:cSld>
   <p:clrMapOvr>
     <a:masterClrMapping/>
   </p:clrMapOvr>
-  <mc:AlternateContent xmlns:mc="http://schemas.openxmlformats.org/markup-compatibility/2006" xmlns:p14="http://schemas.microsoft.com/office/powerpoint/2010/main">
-    <mc:Choice Requires="p14">
+  <mc:AlternateContent xmlns:mc="http://schemas.openxmlformats.org/markup-compatibility/2006">
+    <mc:Choice xmlns:p14="http://schemas.microsoft.com/office/powerpoint/2010/main" Requires="p14">
       <p:transition spd="med" p14:dur="700">
         <p:fade/>
       </p:transition>
     </mc:Choice>
-    <mc:Fallback xmlns="">
+    <mc:Fallback>
       <p:transition spd="med">
         <p:fade/>
       </p:transition>
@@ -1751,20 +1743,20 @@
     </p:spTree>
     <p:extLst>
       <p:ext uri="{BB962C8B-B14F-4D97-AF65-F5344CB8AC3E}">
-        <p14:creationId xmlns:p14="http://schemas.microsoft.com/office/powerpoint/2010/main" val="2531664779"/>
+        <p14:creationId xmlns:p14="http://schemas.microsoft.com/office/powerpoint/2010/main" val="1078033525"/>
       </p:ext>
     </p:extLst>
   </p:cSld>
   <p:clrMapOvr>
     <a:masterClrMapping/>
   </p:clrMapOvr>
-  <mc:AlternateContent xmlns:mc="http://schemas.openxmlformats.org/markup-compatibility/2006" xmlns:p14="http://schemas.microsoft.com/office/powerpoint/2010/main">
-    <mc:Choice Requires="p14">
+  <mc:AlternateContent xmlns:mc="http://schemas.openxmlformats.org/markup-compatibility/2006">
+    <mc:Choice xmlns:p14="http://schemas.microsoft.com/office/powerpoint/2010/main" Requires="p14">
       <p:transition spd="med" p14:dur="700">
         <p:fade/>
       </p:transition>
     </mc:Choice>
-    <mc:Fallback xmlns="">
+    <mc:Fallback>
       <p:transition spd="med">
         <p:fade/>
       </p:transition>
@@ -1840,20 +1832,20 @@
     </p:spTree>
     <p:extLst>
       <p:ext uri="{BB962C8B-B14F-4D97-AF65-F5344CB8AC3E}">
-        <p14:creationId xmlns:p14="http://schemas.microsoft.com/office/powerpoint/2010/main" val="3818584735"/>
+        <p14:creationId xmlns:p14="http://schemas.microsoft.com/office/powerpoint/2010/main" val="2254872328"/>
       </p:ext>
     </p:extLst>
   </p:cSld>
   <p:clrMapOvr>
     <a:masterClrMapping/>
   </p:clrMapOvr>
-  <mc:AlternateContent xmlns:mc="http://schemas.openxmlformats.org/markup-compatibility/2006" xmlns:p14="http://schemas.microsoft.com/office/powerpoint/2010/main">
-    <mc:Choice Requires="p14">
+  <mc:AlternateContent xmlns:mc="http://schemas.openxmlformats.org/markup-compatibility/2006">
+    <mc:Choice xmlns:p14="http://schemas.microsoft.com/office/powerpoint/2010/main" Requires="p14">
       <p:transition spd="med" p14:dur="700">
         <p:fade/>
       </p:transition>
     </mc:Choice>
-    <mc:Fallback xmlns="">
+    <mc:Fallback>
       <p:transition spd="med">
         <p:fade/>
       </p:transition>
@@ -1929,20 +1921,20 @@
     </p:spTree>
     <p:extLst>
       <p:ext uri="{BB962C8B-B14F-4D97-AF65-F5344CB8AC3E}">
-        <p14:creationId xmlns:p14="http://schemas.microsoft.com/office/powerpoint/2010/main" val="3915403065"/>
+        <p14:creationId xmlns:p14="http://schemas.microsoft.com/office/powerpoint/2010/main" val="1397419413"/>
       </p:ext>
     </p:extLst>
   </p:cSld>
   <p:clrMapOvr>
     <a:masterClrMapping/>
   </p:clrMapOvr>
-  <mc:AlternateContent xmlns:mc="http://schemas.openxmlformats.org/markup-compatibility/2006" xmlns:p14="http://schemas.microsoft.com/office/powerpoint/2010/main">
-    <mc:Choice Requires="p14">
+  <mc:AlternateContent xmlns:mc="http://schemas.openxmlformats.org/markup-compatibility/2006">
+    <mc:Choice xmlns:p14="http://schemas.microsoft.com/office/powerpoint/2010/main" Requires="p14">
       <p:transition spd="med" p14:dur="700">
         <p:fade/>
       </p:transition>
     </mc:Choice>
-    <mc:Fallback xmlns="">
+    <mc:Fallback>
       <p:transition spd="med">
         <p:fade/>
       </p:transition>
@@ -2018,20 +2010,20 @@
     </p:spTree>
     <p:extLst>
       <p:ext uri="{BB962C8B-B14F-4D97-AF65-F5344CB8AC3E}">
-        <p14:creationId xmlns:p14="http://schemas.microsoft.com/office/powerpoint/2010/main" val="2717008926"/>
+        <p14:creationId xmlns:p14="http://schemas.microsoft.com/office/powerpoint/2010/main" val="2581633383"/>
       </p:ext>
     </p:extLst>
   </p:cSld>
   <p:clrMapOvr>
     <a:masterClrMapping/>
   </p:clrMapOvr>
-  <mc:AlternateContent xmlns:mc="http://schemas.openxmlformats.org/markup-compatibility/2006" xmlns:p14="http://schemas.microsoft.com/office/powerpoint/2010/main">
-    <mc:Choice Requires="p14">
+  <mc:AlternateContent xmlns:mc="http://schemas.openxmlformats.org/markup-compatibility/2006">
+    <mc:Choice xmlns:p14="http://schemas.microsoft.com/office/powerpoint/2010/main" Requires="p14">
       <p:transition spd="med" p14:dur="700">
         <p:fade/>
       </p:transition>
     </mc:Choice>
-    <mc:Fallback xmlns="">
+    <mc:Fallback>
       <p:transition spd="med">
         <p:fade/>
       </p:transition>
@@ -2107,20 +2099,20 @@
     </p:spTree>
     <p:extLst>
       <p:ext uri="{BB962C8B-B14F-4D97-AF65-F5344CB8AC3E}">
-        <p14:creationId xmlns:p14="http://schemas.microsoft.com/office/powerpoint/2010/main" val="1647233767"/>
+        <p14:creationId xmlns:p14="http://schemas.microsoft.com/office/powerpoint/2010/main" val="2342677882"/>
       </p:ext>
     </p:extLst>
   </p:cSld>
   <p:clrMapOvr>
     <a:masterClrMapping/>
   </p:clrMapOvr>
-  <mc:AlternateContent xmlns:mc="http://schemas.openxmlformats.org/markup-compatibility/2006" xmlns:p14="http://schemas.microsoft.com/office/powerpoint/2010/main">
-    <mc:Choice Requires="p14">
+  <mc:AlternateContent xmlns:mc="http://schemas.openxmlformats.org/markup-compatibility/2006">
+    <mc:Choice xmlns:p14="http://schemas.microsoft.com/office/powerpoint/2010/main" Requires="p14">
       <p:transition spd="med" p14:dur="700">
         <p:fade/>
       </p:transition>
     </mc:Choice>
-    <mc:Fallback xmlns="">
+    <mc:Fallback>
       <p:transition spd="med">
         <p:fade/>
       </p:transition>
@@ -2196,20 +2188,20 @@
     </p:spTree>
     <p:extLst>
       <p:ext uri="{BB962C8B-B14F-4D97-AF65-F5344CB8AC3E}">
-        <p14:creationId xmlns:p14="http://schemas.microsoft.com/office/powerpoint/2010/main" val="1825612297"/>
+        <p14:creationId xmlns:p14="http://schemas.microsoft.com/office/powerpoint/2010/main" val="1963920009"/>
       </p:ext>
     </p:extLst>
   </p:cSld>
   <p:clrMapOvr>
     <a:masterClrMapping/>
   </p:clrMapOvr>
-  <mc:AlternateContent xmlns:mc="http://schemas.openxmlformats.org/markup-compatibility/2006" xmlns:p14="http://schemas.microsoft.com/office/powerpoint/2010/main">
-    <mc:Choice Requires="p14">
+  <mc:AlternateContent xmlns:mc="http://schemas.openxmlformats.org/markup-compatibility/2006">
+    <mc:Choice xmlns:p14="http://schemas.microsoft.com/office/powerpoint/2010/main" Requires="p14">
       <p:transition spd="med" p14:dur="700">
         <p:fade/>
       </p:transition>
     </mc:Choice>
-    <mc:Fallback xmlns="">
+    <mc:Fallback>
       <p:transition spd="med">
         <p:fade/>
       </p:transition>
@@ -2285,20 +2277,465 @@
     </p:spTree>
     <p:extLst>
       <p:ext uri="{BB962C8B-B14F-4D97-AF65-F5344CB8AC3E}">
-        <p14:creationId xmlns:p14="http://schemas.microsoft.com/office/powerpoint/2010/main" val="1651341141"/>
+        <p14:creationId xmlns:p14="http://schemas.microsoft.com/office/powerpoint/2010/main" val="1584246280"/>
       </p:ext>
     </p:extLst>
   </p:cSld>
   <p:clrMapOvr>
     <a:masterClrMapping/>
   </p:clrMapOvr>
-  <mc:AlternateContent xmlns:mc="http://schemas.openxmlformats.org/markup-compatibility/2006" xmlns:p14="http://schemas.microsoft.com/office/powerpoint/2010/main">
-    <mc:Choice Requires="p14">
+  <mc:AlternateContent xmlns:mc="http://schemas.openxmlformats.org/markup-compatibility/2006">
+    <mc:Choice xmlns:p14="http://schemas.microsoft.com/office/powerpoint/2010/main" Requires="p14">
       <p:transition spd="med" p14:dur="700">
         <p:fade/>
       </p:transition>
     </mc:Choice>
-    <mc:Fallback xmlns="">
+    <mc:Fallback>
+      <p:transition spd="med">
+        <p:fade/>
+      </p:transition>
+    </mc:Fallback>
+  </mc:AlternateContent>
+</p:sld>
+</file>
+
+<file path=ppt/slides/slide25.xml><?xml version="1.0" encoding="utf-8"?>
+<p:sld xmlns:a="http://schemas.openxmlformats.org/drawingml/2006/main" xmlns:r="http://schemas.openxmlformats.org/officeDocument/2006/relationships" xmlns:p="http://schemas.openxmlformats.org/presentationml/2006/main">
+  <p:cSld>
+    <p:bg>
+      <p:bgPr>
+        <a:noFill/>
+        <a:effectLst/>
+      </p:bgPr>
+    </p:bg>
+    <p:spTree>
+      <p:nvGrpSpPr>
+        <p:cNvPr id="1" name=""/>
+        <p:cNvGrpSpPr/>
+        <p:nvPr/>
+      </p:nvGrpSpPr>
+      <p:grpSpPr>
+        <a:xfrm>
+          <a:off x="0" y="0"/>
+          <a:ext cx="0" cy="0"/>
+          <a:chOff x="0" y="0"/>
+          <a:chExt cx="0" cy="0"/>
+        </a:xfrm>
+      </p:grpSpPr>
+      <p:sp>
+        <p:nvSpPr>
+          <p:cNvPr id="2" name="Title 1" hidden="1"/>
+          <p:cNvSpPr>
+            <a:spLocks noGrp="1"/>
+          </p:cNvSpPr>
+          <p:nvPr>
+            <p:ph type="title"/>
+          </p:nvPr>
+        </p:nvSpPr>
+        <p:spPr/>
+        <p:txBody>
+          <a:bodyPr/>
+          <a:lstStyle/>
+          <a:p>
+            <a:endParaRPr lang="en-US"/>
+          </a:p>
+        </p:txBody>
+      </p:sp>
+      <p:pic>
+        <p:nvPicPr>
+          <p:cNvPr id="3" name="Picture 2"/>
+          <p:cNvPicPr/>
+          <p:nvPr/>
+        </p:nvPicPr>
+        <p:blipFill>
+          <a:blip r:embed="rId2"/>
+          <a:stretch>
+            <a:fillRect/>
+          </a:stretch>
+        </p:blipFill>
+        <p:spPr>
+          <a:xfrm>
+            <a:off x="0" y="0"/>
+            <a:ext cx="12192000" cy="6858000"/>
+          </a:xfrm>
+          <a:prstGeom prst="rect">
+            <a:avLst/>
+          </a:prstGeom>
+        </p:spPr>
+      </p:pic>
+    </p:spTree>
+    <p:extLst>
+      <p:ext uri="{BB962C8B-B14F-4D97-AF65-F5344CB8AC3E}">
+        <p14:creationId xmlns:p14="http://schemas.microsoft.com/office/powerpoint/2010/main" val="896724519"/>
+      </p:ext>
+    </p:extLst>
+  </p:cSld>
+  <p:clrMapOvr>
+    <a:masterClrMapping/>
+  </p:clrMapOvr>
+  <mc:AlternateContent xmlns:mc="http://schemas.openxmlformats.org/markup-compatibility/2006">
+    <mc:Choice xmlns:p14="http://schemas.microsoft.com/office/powerpoint/2010/main" Requires="p14">
+      <p:transition spd="med" p14:dur="700">
+        <p:fade/>
+      </p:transition>
+    </mc:Choice>
+    <mc:Fallback>
+      <p:transition spd="med">
+        <p:fade/>
+      </p:transition>
+    </mc:Fallback>
+  </mc:AlternateContent>
+</p:sld>
+</file>
+
+<file path=ppt/slides/slide26.xml><?xml version="1.0" encoding="utf-8"?>
+<p:sld xmlns:a="http://schemas.openxmlformats.org/drawingml/2006/main" xmlns:r="http://schemas.openxmlformats.org/officeDocument/2006/relationships" xmlns:p="http://schemas.openxmlformats.org/presentationml/2006/main">
+  <p:cSld>
+    <p:bg>
+      <p:bgPr>
+        <a:noFill/>
+        <a:effectLst/>
+      </p:bgPr>
+    </p:bg>
+    <p:spTree>
+      <p:nvGrpSpPr>
+        <p:cNvPr id="1" name=""/>
+        <p:cNvGrpSpPr/>
+        <p:nvPr/>
+      </p:nvGrpSpPr>
+      <p:grpSpPr>
+        <a:xfrm>
+          <a:off x="0" y="0"/>
+          <a:ext cx="0" cy="0"/>
+          <a:chOff x="0" y="0"/>
+          <a:chExt cx="0" cy="0"/>
+        </a:xfrm>
+      </p:grpSpPr>
+      <p:sp>
+        <p:nvSpPr>
+          <p:cNvPr id="2" name="Title 1" hidden="1"/>
+          <p:cNvSpPr>
+            <a:spLocks noGrp="1"/>
+          </p:cNvSpPr>
+          <p:nvPr>
+            <p:ph type="title"/>
+          </p:nvPr>
+        </p:nvSpPr>
+        <p:spPr/>
+        <p:txBody>
+          <a:bodyPr/>
+          <a:lstStyle/>
+          <a:p>
+            <a:endParaRPr lang="en-US"/>
+          </a:p>
+        </p:txBody>
+      </p:sp>
+      <p:pic>
+        <p:nvPicPr>
+          <p:cNvPr id="3" name="Picture 2"/>
+          <p:cNvPicPr/>
+          <p:nvPr/>
+        </p:nvPicPr>
+        <p:blipFill>
+          <a:blip r:embed="rId2"/>
+          <a:stretch>
+            <a:fillRect/>
+          </a:stretch>
+        </p:blipFill>
+        <p:spPr>
+          <a:xfrm>
+            <a:off x="0" y="0"/>
+            <a:ext cx="12192000" cy="6858000"/>
+          </a:xfrm>
+          <a:prstGeom prst="rect">
+            <a:avLst/>
+          </a:prstGeom>
+        </p:spPr>
+      </p:pic>
+    </p:spTree>
+    <p:extLst>
+      <p:ext uri="{BB962C8B-B14F-4D97-AF65-F5344CB8AC3E}">
+        <p14:creationId xmlns:p14="http://schemas.microsoft.com/office/powerpoint/2010/main" val="1593344574"/>
+      </p:ext>
+    </p:extLst>
+  </p:cSld>
+  <p:clrMapOvr>
+    <a:masterClrMapping/>
+  </p:clrMapOvr>
+  <mc:AlternateContent xmlns:mc="http://schemas.openxmlformats.org/markup-compatibility/2006">
+    <mc:Choice xmlns:p14="http://schemas.microsoft.com/office/powerpoint/2010/main" Requires="p14">
+      <p:transition spd="med" p14:dur="700">
+        <p:fade/>
+      </p:transition>
+    </mc:Choice>
+    <mc:Fallback>
+      <p:transition spd="med">
+        <p:fade/>
+      </p:transition>
+    </mc:Fallback>
+  </mc:AlternateContent>
+</p:sld>
+</file>
+
+<file path=ppt/slides/slide27.xml><?xml version="1.0" encoding="utf-8"?>
+<p:sld xmlns:a="http://schemas.openxmlformats.org/drawingml/2006/main" xmlns:r="http://schemas.openxmlformats.org/officeDocument/2006/relationships" xmlns:p="http://schemas.openxmlformats.org/presentationml/2006/main">
+  <p:cSld>
+    <p:bg>
+      <p:bgPr>
+        <a:noFill/>
+        <a:effectLst/>
+      </p:bgPr>
+    </p:bg>
+    <p:spTree>
+      <p:nvGrpSpPr>
+        <p:cNvPr id="1" name=""/>
+        <p:cNvGrpSpPr/>
+        <p:nvPr/>
+      </p:nvGrpSpPr>
+      <p:grpSpPr>
+        <a:xfrm>
+          <a:off x="0" y="0"/>
+          <a:ext cx="0" cy="0"/>
+          <a:chOff x="0" y="0"/>
+          <a:chExt cx="0" cy="0"/>
+        </a:xfrm>
+      </p:grpSpPr>
+      <p:sp>
+        <p:nvSpPr>
+          <p:cNvPr id="2" name="Title 1" hidden="1"/>
+          <p:cNvSpPr>
+            <a:spLocks noGrp="1"/>
+          </p:cNvSpPr>
+          <p:nvPr>
+            <p:ph type="title"/>
+          </p:nvPr>
+        </p:nvSpPr>
+        <p:spPr/>
+        <p:txBody>
+          <a:bodyPr/>
+          <a:lstStyle/>
+          <a:p>
+            <a:endParaRPr lang="en-US"/>
+          </a:p>
+        </p:txBody>
+      </p:sp>
+      <p:pic>
+        <p:nvPicPr>
+          <p:cNvPr id="3" name="Picture 2"/>
+          <p:cNvPicPr/>
+          <p:nvPr/>
+        </p:nvPicPr>
+        <p:blipFill>
+          <a:blip r:embed="rId2"/>
+          <a:stretch>
+            <a:fillRect/>
+          </a:stretch>
+        </p:blipFill>
+        <p:spPr>
+          <a:xfrm>
+            <a:off x="0" y="0"/>
+            <a:ext cx="12192000" cy="6858000"/>
+          </a:xfrm>
+          <a:prstGeom prst="rect">
+            <a:avLst/>
+          </a:prstGeom>
+        </p:spPr>
+      </p:pic>
+    </p:spTree>
+    <p:extLst>
+      <p:ext uri="{BB962C8B-B14F-4D97-AF65-F5344CB8AC3E}">
+        <p14:creationId xmlns:p14="http://schemas.microsoft.com/office/powerpoint/2010/main" val="1671811526"/>
+      </p:ext>
+    </p:extLst>
+  </p:cSld>
+  <p:clrMapOvr>
+    <a:masterClrMapping/>
+  </p:clrMapOvr>
+  <mc:AlternateContent xmlns:mc="http://schemas.openxmlformats.org/markup-compatibility/2006">
+    <mc:Choice xmlns:p14="http://schemas.microsoft.com/office/powerpoint/2010/main" Requires="p14">
+      <p:transition spd="med" p14:dur="700">
+        <p:fade/>
+      </p:transition>
+    </mc:Choice>
+    <mc:Fallback>
+      <p:transition spd="med">
+        <p:fade/>
+      </p:transition>
+    </mc:Fallback>
+  </mc:AlternateContent>
+</p:sld>
+</file>
+
+<file path=ppt/slides/slide28.xml><?xml version="1.0" encoding="utf-8"?>
+<p:sld xmlns:a="http://schemas.openxmlformats.org/drawingml/2006/main" xmlns:r="http://schemas.openxmlformats.org/officeDocument/2006/relationships" xmlns:p="http://schemas.openxmlformats.org/presentationml/2006/main">
+  <p:cSld>
+    <p:bg>
+      <p:bgPr>
+        <a:noFill/>
+        <a:effectLst/>
+      </p:bgPr>
+    </p:bg>
+    <p:spTree>
+      <p:nvGrpSpPr>
+        <p:cNvPr id="1" name=""/>
+        <p:cNvGrpSpPr/>
+        <p:nvPr/>
+      </p:nvGrpSpPr>
+      <p:grpSpPr>
+        <a:xfrm>
+          <a:off x="0" y="0"/>
+          <a:ext cx="0" cy="0"/>
+          <a:chOff x="0" y="0"/>
+          <a:chExt cx="0" cy="0"/>
+        </a:xfrm>
+      </p:grpSpPr>
+      <p:sp>
+        <p:nvSpPr>
+          <p:cNvPr id="2" name="Title 1" hidden="1"/>
+          <p:cNvSpPr>
+            <a:spLocks noGrp="1"/>
+          </p:cNvSpPr>
+          <p:nvPr>
+            <p:ph type="title"/>
+          </p:nvPr>
+        </p:nvSpPr>
+        <p:spPr/>
+        <p:txBody>
+          <a:bodyPr/>
+          <a:lstStyle/>
+          <a:p>
+            <a:endParaRPr lang="en-US"/>
+          </a:p>
+        </p:txBody>
+      </p:sp>
+      <p:pic>
+        <p:nvPicPr>
+          <p:cNvPr id="3" name="Picture 2"/>
+          <p:cNvPicPr/>
+          <p:nvPr/>
+        </p:nvPicPr>
+        <p:blipFill>
+          <a:blip r:embed="rId2"/>
+          <a:stretch>
+            <a:fillRect/>
+          </a:stretch>
+        </p:blipFill>
+        <p:spPr>
+          <a:xfrm>
+            <a:off x="0" y="0"/>
+            <a:ext cx="12192000" cy="6858000"/>
+          </a:xfrm>
+          <a:prstGeom prst="rect">
+            <a:avLst/>
+          </a:prstGeom>
+        </p:spPr>
+      </p:pic>
+    </p:spTree>
+    <p:extLst>
+      <p:ext uri="{BB962C8B-B14F-4D97-AF65-F5344CB8AC3E}">
+        <p14:creationId xmlns:p14="http://schemas.microsoft.com/office/powerpoint/2010/main" val="2464129562"/>
+      </p:ext>
+    </p:extLst>
+  </p:cSld>
+  <p:clrMapOvr>
+    <a:masterClrMapping/>
+  </p:clrMapOvr>
+  <mc:AlternateContent xmlns:mc="http://schemas.openxmlformats.org/markup-compatibility/2006">
+    <mc:Choice xmlns:p14="http://schemas.microsoft.com/office/powerpoint/2010/main" Requires="p14">
+      <p:transition spd="med" p14:dur="700">
+        <p:fade/>
+      </p:transition>
+    </mc:Choice>
+    <mc:Fallback>
+      <p:transition spd="med">
+        <p:fade/>
+      </p:transition>
+    </mc:Fallback>
+  </mc:AlternateContent>
+</p:sld>
+</file>
+
+<file path=ppt/slides/slide29.xml><?xml version="1.0" encoding="utf-8"?>
+<p:sld xmlns:a="http://schemas.openxmlformats.org/drawingml/2006/main" xmlns:r="http://schemas.openxmlformats.org/officeDocument/2006/relationships" xmlns:p="http://schemas.openxmlformats.org/presentationml/2006/main" show="0">
+  <p:cSld>
+    <p:bg>
+      <p:bgPr>
+        <a:noFill/>
+        <a:effectLst/>
+      </p:bgPr>
+    </p:bg>
+    <p:spTree>
+      <p:nvGrpSpPr>
+        <p:cNvPr id="1" name=""/>
+        <p:cNvGrpSpPr/>
+        <p:nvPr/>
+      </p:nvGrpSpPr>
+      <p:grpSpPr>
+        <a:xfrm>
+          <a:off x="0" y="0"/>
+          <a:ext cx="0" cy="0"/>
+          <a:chOff x="0" y="0"/>
+          <a:chExt cx="0" cy="0"/>
+        </a:xfrm>
+      </p:grpSpPr>
+      <p:sp>
+        <p:nvSpPr>
+          <p:cNvPr id="2" name="Title 1" hidden="1"/>
+          <p:cNvSpPr>
+            <a:spLocks noGrp="1"/>
+          </p:cNvSpPr>
+          <p:nvPr>
+            <p:ph type="title"/>
+          </p:nvPr>
+        </p:nvSpPr>
+        <p:spPr/>
+        <p:txBody>
+          <a:bodyPr/>
+          <a:lstStyle/>
+          <a:p>
+            <a:endParaRPr lang="en-US"/>
+          </a:p>
+        </p:txBody>
+      </p:sp>
+      <p:pic>
+        <p:nvPicPr>
+          <p:cNvPr id="3" name="Picture 2"/>
+          <p:cNvPicPr/>
+          <p:nvPr/>
+        </p:nvPicPr>
+        <p:blipFill>
+          <a:blip r:embed="rId2"/>
+          <a:stretch>
+            <a:fillRect/>
+          </a:stretch>
+        </p:blipFill>
+        <p:spPr>
+          <a:xfrm>
+            <a:off x="0" y="0"/>
+            <a:ext cx="12192000" cy="6858000"/>
+          </a:xfrm>
+          <a:prstGeom prst="rect">
+            <a:avLst/>
+          </a:prstGeom>
+        </p:spPr>
+      </p:pic>
+    </p:spTree>
+    <p:extLst>
+      <p:ext uri="{BB962C8B-B14F-4D97-AF65-F5344CB8AC3E}">
+        <p14:creationId xmlns:p14="http://schemas.microsoft.com/office/powerpoint/2010/main" val="1267610861"/>
+      </p:ext>
+    </p:extLst>
+  </p:cSld>
+  <p:clrMapOvr>
+    <a:masterClrMapping/>
+  </p:clrMapOvr>
+  <mc:AlternateContent xmlns:mc="http://schemas.openxmlformats.org/markup-compatibility/2006">
+    <mc:Choice xmlns:p14="http://schemas.microsoft.com/office/powerpoint/2010/main" Requires="p14">
+      <p:transition spd="med" p14:dur="700">
+        <p:fade/>
+      </p:transition>
+    </mc:Choice>
+    <mc:Fallback>
       <p:transition spd="med">
         <p:fade/>
       </p:transition>
@@ -2374,20 +2811,287 @@
     </p:spTree>
     <p:extLst>
       <p:ext uri="{BB962C8B-B14F-4D97-AF65-F5344CB8AC3E}">
-        <p14:creationId xmlns:p14="http://schemas.microsoft.com/office/powerpoint/2010/main" val="2331957313"/>
+        <p14:creationId xmlns:p14="http://schemas.microsoft.com/office/powerpoint/2010/main" val="1472417211"/>
       </p:ext>
     </p:extLst>
   </p:cSld>
   <p:clrMapOvr>
     <a:masterClrMapping/>
   </p:clrMapOvr>
-  <mc:AlternateContent xmlns:mc="http://schemas.openxmlformats.org/markup-compatibility/2006" xmlns:p14="http://schemas.microsoft.com/office/powerpoint/2010/main">
-    <mc:Choice Requires="p14">
+  <mc:AlternateContent xmlns:mc="http://schemas.openxmlformats.org/markup-compatibility/2006">
+    <mc:Choice xmlns:p14="http://schemas.microsoft.com/office/powerpoint/2010/main" Requires="p14">
       <p:transition spd="med" p14:dur="700">
         <p:fade/>
       </p:transition>
     </mc:Choice>
-    <mc:Fallback xmlns="">
+    <mc:Fallback>
+      <p:transition spd="med">
+        <p:fade/>
+      </p:transition>
+    </mc:Fallback>
+  </mc:AlternateContent>
+</p:sld>
+</file>
+
+<file path=ppt/slides/slide30.xml><?xml version="1.0" encoding="utf-8"?>
+<p:sld xmlns:a="http://schemas.openxmlformats.org/drawingml/2006/main" xmlns:r="http://schemas.openxmlformats.org/officeDocument/2006/relationships" xmlns:p="http://schemas.openxmlformats.org/presentationml/2006/main" show="0">
+  <p:cSld>
+    <p:bg>
+      <p:bgPr>
+        <a:noFill/>
+        <a:effectLst/>
+      </p:bgPr>
+    </p:bg>
+    <p:spTree>
+      <p:nvGrpSpPr>
+        <p:cNvPr id="1" name=""/>
+        <p:cNvGrpSpPr/>
+        <p:nvPr/>
+      </p:nvGrpSpPr>
+      <p:grpSpPr>
+        <a:xfrm>
+          <a:off x="0" y="0"/>
+          <a:ext cx="0" cy="0"/>
+          <a:chOff x="0" y="0"/>
+          <a:chExt cx="0" cy="0"/>
+        </a:xfrm>
+      </p:grpSpPr>
+      <p:sp>
+        <p:nvSpPr>
+          <p:cNvPr id="2" name="Title 1" hidden="1"/>
+          <p:cNvSpPr>
+            <a:spLocks noGrp="1"/>
+          </p:cNvSpPr>
+          <p:nvPr>
+            <p:ph type="title"/>
+          </p:nvPr>
+        </p:nvSpPr>
+        <p:spPr/>
+        <p:txBody>
+          <a:bodyPr/>
+          <a:lstStyle/>
+          <a:p>
+            <a:endParaRPr lang="en-US"/>
+          </a:p>
+        </p:txBody>
+      </p:sp>
+      <p:pic>
+        <p:nvPicPr>
+          <p:cNvPr id="3" name="Picture 2"/>
+          <p:cNvPicPr/>
+          <p:nvPr/>
+        </p:nvPicPr>
+        <p:blipFill>
+          <a:blip r:embed="rId2"/>
+          <a:stretch>
+            <a:fillRect/>
+          </a:stretch>
+        </p:blipFill>
+        <p:spPr>
+          <a:xfrm>
+            <a:off x="0" y="0"/>
+            <a:ext cx="12192000" cy="6858000"/>
+          </a:xfrm>
+          <a:prstGeom prst="rect">
+            <a:avLst/>
+          </a:prstGeom>
+        </p:spPr>
+      </p:pic>
+    </p:spTree>
+    <p:extLst>
+      <p:ext uri="{BB962C8B-B14F-4D97-AF65-F5344CB8AC3E}">
+        <p14:creationId xmlns:p14="http://schemas.microsoft.com/office/powerpoint/2010/main" val="2958816505"/>
+      </p:ext>
+    </p:extLst>
+  </p:cSld>
+  <p:clrMapOvr>
+    <a:masterClrMapping/>
+  </p:clrMapOvr>
+  <mc:AlternateContent xmlns:mc="http://schemas.openxmlformats.org/markup-compatibility/2006">
+    <mc:Choice xmlns:p14="http://schemas.microsoft.com/office/powerpoint/2010/main" Requires="p14">
+      <p:transition spd="med" p14:dur="700">
+        <p:fade/>
+      </p:transition>
+    </mc:Choice>
+    <mc:Fallback>
+      <p:transition spd="med">
+        <p:fade/>
+      </p:transition>
+    </mc:Fallback>
+  </mc:AlternateContent>
+</p:sld>
+</file>
+
+<file path=ppt/slides/slide31.xml><?xml version="1.0" encoding="utf-8"?>
+<p:sld xmlns:a="http://schemas.openxmlformats.org/drawingml/2006/main" xmlns:r="http://schemas.openxmlformats.org/officeDocument/2006/relationships" xmlns:p="http://schemas.openxmlformats.org/presentationml/2006/main" show="0">
+  <p:cSld>
+    <p:bg>
+      <p:bgPr>
+        <a:noFill/>
+        <a:effectLst/>
+      </p:bgPr>
+    </p:bg>
+    <p:spTree>
+      <p:nvGrpSpPr>
+        <p:cNvPr id="1" name=""/>
+        <p:cNvGrpSpPr/>
+        <p:nvPr/>
+      </p:nvGrpSpPr>
+      <p:grpSpPr>
+        <a:xfrm>
+          <a:off x="0" y="0"/>
+          <a:ext cx="0" cy="0"/>
+          <a:chOff x="0" y="0"/>
+          <a:chExt cx="0" cy="0"/>
+        </a:xfrm>
+      </p:grpSpPr>
+      <p:sp>
+        <p:nvSpPr>
+          <p:cNvPr id="2" name="Title 1" hidden="1"/>
+          <p:cNvSpPr>
+            <a:spLocks noGrp="1"/>
+          </p:cNvSpPr>
+          <p:nvPr>
+            <p:ph type="title"/>
+          </p:nvPr>
+        </p:nvSpPr>
+        <p:spPr/>
+        <p:txBody>
+          <a:bodyPr/>
+          <a:lstStyle/>
+          <a:p>
+            <a:endParaRPr lang="en-US"/>
+          </a:p>
+        </p:txBody>
+      </p:sp>
+      <p:pic>
+        <p:nvPicPr>
+          <p:cNvPr id="3" name="Picture 2"/>
+          <p:cNvPicPr/>
+          <p:nvPr/>
+        </p:nvPicPr>
+        <p:blipFill>
+          <a:blip r:embed="rId2"/>
+          <a:stretch>
+            <a:fillRect/>
+          </a:stretch>
+        </p:blipFill>
+        <p:spPr>
+          <a:xfrm>
+            <a:off x="0" y="0"/>
+            <a:ext cx="12192000" cy="6858000"/>
+          </a:xfrm>
+          <a:prstGeom prst="rect">
+            <a:avLst/>
+          </a:prstGeom>
+        </p:spPr>
+      </p:pic>
+    </p:spTree>
+    <p:extLst>
+      <p:ext uri="{BB962C8B-B14F-4D97-AF65-F5344CB8AC3E}">
+        <p14:creationId xmlns:p14="http://schemas.microsoft.com/office/powerpoint/2010/main" val="1482933529"/>
+      </p:ext>
+    </p:extLst>
+  </p:cSld>
+  <p:clrMapOvr>
+    <a:masterClrMapping/>
+  </p:clrMapOvr>
+  <mc:AlternateContent xmlns:mc="http://schemas.openxmlformats.org/markup-compatibility/2006">
+    <mc:Choice xmlns:p14="http://schemas.microsoft.com/office/powerpoint/2010/main" Requires="p14">
+      <p:transition spd="med" p14:dur="700">
+        <p:fade/>
+      </p:transition>
+    </mc:Choice>
+    <mc:Fallback>
+      <p:transition spd="med">
+        <p:fade/>
+      </p:transition>
+    </mc:Fallback>
+  </mc:AlternateContent>
+</p:sld>
+</file>
+
+<file path=ppt/slides/slide32.xml><?xml version="1.0" encoding="utf-8"?>
+<p:sld xmlns:a="http://schemas.openxmlformats.org/drawingml/2006/main" xmlns:r="http://schemas.openxmlformats.org/officeDocument/2006/relationships" xmlns:p="http://schemas.openxmlformats.org/presentationml/2006/main" show="0">
+  <p:cSld>
+    <p:bg>
+      <p:bgPr>
+        <a:noFill/>
+        <a:effectLst/>
+      </p:bgPr>
+    </p:bg>
+    <p:spTree>
+      <p:nvGrpSpPr>
+        <p:cNvPr id="1" name=""/>
+        <p:cNvGrpSpPr/>
+        <p:nvPr/>
+      </p:nvGrpSpPr>
+      <p:grpSpPr>
+        <a:xfrm>
+          <a:off x="0" y="0"/>
+          <a:ext cx="0" cy="0"/>
+          <a:chOff x="0" y="0"/>
+          <a:chExt cx="0" cy="0"/>
+        </a:xfrm>
+      </p:grpSpPr>
+      <p:sp>
+        <p:nvSpPr>
+          <p:cNvPr id="2" name="Title 1" hidden="1"/>
+          <p:cNvSpPr>
+            <a:spLocks noGrp="1"/>
+          </p:cNvSpPr>
+          <p:nvPr>
+            <p:ph type="title"/>
+          </p:nvPr>
+        </p:nvSpPr>
+        <p:spPr/>
+        <p:txBody>
+          <a:bodyPr/>
+          <a:lstStyle/>
+          <a:p>
+            <a:endParaRPr lang="en-US"/>
+          </a:p>
+        </p:txBody>
+      </p:sp>
+      <p:pic>
+        <p:nvPicPr>
+          <p:cNvPr id="3" name="Picture 2"/>
+          <p:cNvPicPr/>
+          <p:nvPr/>
+        </p:nvPicPr>
+        <p:blipFill>
+          <a:blip r:embed="rId2"/>
+          <a:stretch>
+            <a:fillRect/>
+          </a:stretch>
+        </p:blipFill>
+        <p:spPr>
+          <a:xfrm>
+            <a:off x="0" y="0"/>
+            <a:ext cx="12192000" cy="6858000"/>
+          </a:xfrm>
+          <a:prstGeom prst="rect">
+            <a:avLst/>
+          </a:prstGeom>
+        </p:spPr>
+      </p:pic>
+    </p:spTree>
+    <p:extLst>
+      <p:ext uri="{BB962C8B-B14F-4D97-AF65-F5344CB8AC3E}">
+        <p14:creationId xmlns:p14="http://schemas.microsoft.com/office/powerpoint/2010/main" val="4286796646"/>
+      </p:ext>
+    </p:extLst>
+  </p:cSld>
+  <p:clrMapOvr>
+    <a:masterClrMapping/>
+  </p:clrMapOvr>
+  <mc:AlternateContent xmlns:mc="http://schemas.openxmlformats.org/markup-compatibility/2006">
+    <mc:Choice xmlns:p14="http://schemas.microsoft.com/office/powerpoint/2010/main" Requires="p14">
+      <p:transition spd="med" p14:dur="700">
+        <p:fade/>
+      </p:transition>
+    </mc:Choice>
+    <mc:Fallback>
       <p:transition spd="med">
         <p:fade/>
       </p:transition>
@@ -2463,20 +3167,20 @@
     </p:spTree>
     <p:extLst>
       <p:ext uri="{BB962C8B-B14F-4D97-AF65-F5344CB8AC3E}">
-        <p14:creationId xmlns:p14="http://schemas.microsoft.com/office/powerpoint/2010/main" val="1460426616"/>
+        <p14:creationId xmlns:p14="http://schemas.microsoft.com/office/powerpoint/2010/main" val="3175895263"/>
       </p:ext>
     </p:extLst>
   </p:cSld>
   <p:clrMapOvr>
     <a:masterClrMapping/>
   </p:clrMapOvr>
-  <mc:AlternateContent xmlns:mc="http://schemas.openxmlformats.org/markup-compatibility/2006" xmlns:p14="http://schemas.microsoft.com/office/powerpoint/2010/main">
-    <mc:Choice Requires="p14">
+  <mc:AlternateContent xmlns:mc="http://schemas.openxmlformats.org/markup-compatibility/2006">
+    <mc:Choice xmlns:p14="http://schemas.microsoft.com/office/powerpoint/2010/main" Requires="p14">
       <p:transition spd="med" p14:dur="700">
         <p:fade/>
       </p:transition>
     </mc:Choice>
-    <mc:Fallback xmlns="">
+    <mc:Fallback>
       <p:transition spd="med">
         <p:fade/>
       </p:transition>
@@ -2552,20 +3256,20 @@
     </p:spTree>
     <p:extLst>
       <p:ext uri="{BB962C8B-B14F-4D97-AF65-F5344CB8AC3E}">
-        <p14:creationId xmlns:p14="http://schemas.microsoft.com/office/powerpoint/2010/main" val="2193594708"/>
+        <p14:creationId xmlns:p14="http://schemas.microsoft.com/office/powerpoint/2010/main" val="3000507850"/>
       </p:ext>
     </p:extLst>
   </p:cSld>
   <p:clrMapOvr>
     <a:masterClrMapping/>
   </p:clrMapOvr>
-  <mc:AlternateContent xmlns:mc="http://schemas.openxmlformats.org/markup-compatibility/2006" xmlns:p14="http://schemas.microsoft.com/office/powerpoint/2010/main">
-    <mc:Choice Requires="p14">
+  <mc:AlternateContent xmlns:mc="http://schemas.openxmlformats.org/markup-compatibility/2006">
+    <mc:Choice xmlns:p14="http://schemas.microsoft.com/office/powerpoint/2010/main" Requires="p14">
       <p:transition spd="med" p14:dur="700">
         <p:fade/>
       </p:transition>
     </mc:Choice>
-    <mc:Fallback xmlns="">
+    <mc:Fallback>
       <p:transition spd="med">
         <p:fade/>
       </p:transition>
@@ -2641,20 +3345,20 @@
     </p:spTree>
     <p:extLst>
       <p:ext uri="{BB962C8B-B14F-4D97-AF65-F5344CB8AC3E}">
-        <p14:creationId xmlns:p14="http://schemas.microsoft.com/office/powerpoint/2010/main" val="1431472454"/>
+        <p14:creationId xmlns:p14="http://schemas.microsoft.com/office/powerpoint/2010/main" val="1768006688"/>
       </p:ext>
     </p:extLst>
   </p:cSld>
   <p:clrMapOvr>
     <a:masterClrMapping/>
   </p:clrMapOvr>
-  <mc:AlternateContent xmlns:mc="http://schemas.openxmlformats.org/markup-compatibility/2006" xmlns:p14="http://schemas.microsoft.com/office/powerpoint/2010/main">
-    <mc:Choice Requires="p14">
+  <mc:AlternateContent xmlns:mc="http://schemas.openxmlformats.org/markup-compatibility/2006">
+    <mc:Choice xmlns:p14="http://schemas.microsoft.com/office/powerpoint/2010/main" Requires="p14">
       <p:transition spd="med" p14:dur="700">
         <p:fade/>
       </p:transition>
     </mc:Choice>
-    <mc:Fallback xmlns="">
+    <mc:Fallback>
       <p:transition spd="med">
         <p:fade/>
       </p:transition>
@@ -2730,20 +3434,20 @@
     </p:spTree>
     <p:extLst>
       <p:ext uri="{BB962C8B-B14F-4D97-AF65-F5344CB8AC3E}">
-        <p14:creationId xmlns:p14="http://schemas.microsoft.com/office/powerpoint/2010/main" val="274390329"/>
+        <p14:creationId xmlns:p14="http://schemas.microsoft.com/office/powerpoint/2010/main" val="3250412110"/>
       </p:ext>
     </p:extLst>
   </p:cSld>
   <p:clrMapOvr>
     <a:masterClrMapping/>
   </p:clrMapOvr>
-  <mc:AlternateContent xmlns:mc="http://schemas.openxmlformats.org/markup-compatibility/2006" xmlns:p14="http://schemas.microsoft.com/office/powerpoint/2010/main">
-    <mc:Choice Requires="p14">
+  <mc:AlternateContent xmlns:mc="http://schemas.openxmlformats.org/markup-compatibility/2006">
+    <mc:Choice xmlns:p14="http://schemas.microsoft.com/office/powerpoint/2010/main" Requires="p14">
       <p:transition spd="med" p14:dur="700">
         <p:fade/>
       </p:transition>
     </mc:Choice>
-    <mc:Fallback xmlns="">
+    <mc:Fallback>
       <p:transition spd="med">
         <p:fade/>
       </p:transition>
@@ -2819,20 +3523,20 @@
     </p:spTree>
     <p:extLst>
       <p:ext uri="{BB962C8B-B14F-4D97-AF65-F5344CB8AC3E}">
-        <p14:creationId xmlns:p14="http://schemas.microsoft.com/office/powerpoint/2010/main" val="2950457897"/>
+        <p14:creationId xmlns:p14="http://schemas.microsoft.com/office/powerpoint/2010/main" val="34971341"/>
       </p:ext>
     </p:extLst>
   </p:cSld>
   <p:clrMapOvr>
     <a:masterClrMapping/>
   </p:clrMapOvr>
-  <mc:AlternateContent xmlns:mc="http://schemas.openxmlformats.org/markup-compatibility/2006" xmlns:p14="http://schemas.microsoft.com/office/powerpoint/2010/main">
-    <mc:Choice Requires="p14">
+  <mc:AlternateContent xmlns:mc="http://schemas.openxmlformats.org/markup-compatibility/2006">
+    <mc:Choice xmlns:p14="http://schemas.microsoft.com/office/powerpoint/2010/main" Requires="p14">
       <p:transition spd="med" p14:dur="700">
         <p:fade/>
       </p:transition>
     </mc:Choice>
-    <mc:Fallback xmlns="">
+    <mc:Fallback>
       <p:transition spd="med">
         <p:fade/>
       </p:transition>
@@ -2908,20 +3612,20 @@
     </p:spTree>
     <p:extLst>
       <p:ext uri="{BB962C8B-B14F-4D97-AF65-F5344CB8AC3E}">
-        <p14:creationId xmlns:p14="http://schemas.microsoft.com/office/powerpoint/2010/main" val="3842351157"/>
+        <p14:creationId xmlns:p14="http://schemas.microsoft.com/office/powerpoint/2010/main" val="3465165728"/>
       </p:ext>
     </p:extLst>
   </p:cSld>
   <p:clrMapOvr>
     <a:masterClrMapping/>
   </p:clrMapOvr>
-  <mc:AlternateContent xmlns:mc="http://schemas.openxmlformats.org/markup-compatibility/2006" xmlns:p14="http://schemas.microsoft.com/office/powerpoint/2010/main">
-    <mc:Choice Requires="p14">
+  <mc:AlternateContent xmlns:mc="http://schemas.openxmlformats.org/markup-compatibility/2006">
+    <mc:Choice xmlns:p14="http://schemas.microsoft.com/office/powerpoint/2010/main" Requires="p14">
       <p:transition spd="med" p14:dur="700">
         <p:fade/>
       </p:transition>
     </mc:Choice>
-    <mc:Fallback xmlns="">
+    <mc:Fallback>
       <p:transition spd="med">
         <p:fade/>
       </p:transition>

</xml_diff>